<commit_message>
updates to contributors guide and downloads page on website
git-svn-id: https://svn.apache.org/repos/asf/incubator/isis/trunk@1146560 13f79535-47bb-0310-9956-ffa450edef68
</commit_message>
<xml_diff>
--- a/framework/src/docbkx/guide/images/release/release-process.pptx
+++ b/framework/src/docbkx/guide/images/release/release-process.pptx
@@ -288,7 +288,7 @@
           <a:p>
             <a:fld id="{E67D9F0B-A441-444E-8CA3-4D29C317007F}" type="datetimeFigureOut">
               <a:rPr lang="en-GB" smtClean="0"/>
-              <a:t>25/06/2011</a:t>
+              <a:t>14/07/2011</a:t>
             </a:fld>
             <a:endParaRPr lang="en-GB"/>
           </a:p>
@@ -458,7 +458,7 @@
           <a:p>
             <a:fld id="{E67D9F0B-A441-444E-8CA3-4D29C317007F}" type="datetimeFigureOut">
               <a:rPr lang="en-GB" smtClean="0"/>
-              <a:t>25/06/2011</a:t>
+              <a:t>14/07/2011</a:t>
             </a:fld>
             <a:endParaRPr lang="en-GB"/>
           </a:p>
@@ -638,7 +638,7 @@
           <a:p>
             <a:fld id="{E67D9F0B-A441-444E-8CA3-4D29C317007F}" type="datetimeFigureOut">
               <a:rPr lang="en-GB" smtClean="0"/>
-              <a:t>25/06/2011</a:t>
+              <a:t>14/07/2011</a:t>
             </a:fld>
             <a:endParaRPr lang="en-GB"/>
           </a:p>
@@ -808,7 +808,7 @@
           <a:p>
             <a:fld id="{E67D9F0B-A441-444E-8CA3-4D29C317007F}" type="datetimeFigureOut">
               <a:rPr lang="en-GB" smtClean="0"/>
-              <a:t>25/06/2011</a:t>
+              <a:t>14/07/2011</a:t>
             </a:fld>
             <a:endParaRPr lang="en-GB"/>
           </a:p>
@@ -1054,7 +1054,7 @@
           <a:p>
             <a:fld id="{E67D9F0B-A441-444E-8CA3-4D29C317007F}" type="datetimeFigureOut">
               <a:rPr lang="en-GB" smtClean="0"/>
-              <a:t>25/06/2011</a:t>
+              <a:t>14/07/2011</a:t>
             </a:fld>
             <a:endParaRPr lang="en-GB"/>
           </a:p>
@@ -1342,7 +1342,7 @@
           <a:p>
             <a:fld id="{E67D9F0B-A441-444E-8CA3-4D29C317007F}" type="datetimeFigureOut">
               <a:rPr lang="en-GB" smtClean="0"/>
-              <a:t>25/06/2011</a:t>
+              <a:t>14/07/2011</a:t>
             </a:fld>
             <a:endParaRPr lang="en-GB"/>
           </a:p>
@@ -1764,7 +1764,7 @@
           <a:p>
             <a:fld id="{E67D9F0B-A441-444E-8CA3-4D29C317007F}" type="datetimeFigureOut">
               <a:rPr lang="en-GB" smtClean="0"/>
-              <a:t>25/06/2011</a:t>
+              <a:t>14/07/2011</a:t>
             </a:fld>
             <a:endParaRPr lang="en-GB"/>
           </a:p>
@@ -1882,7 +1882,7 @@
           <a:p>
             <a:fld id="{E67D9F0B-A441-444E-8CA3-4D29C317007F}" type="datetimeFigureOut">
               <a:rPr lang="en-GB" smtClean="0"/>
-              <a:t>25/06/2011</a:t>
+              <a:t>14/07/2011</a:t>
             </a:fld>
             <a:endParaRPr lang="en-GB"/>
           </a:p>
@@ -1977,7 +1977,7 @@
           <a:p>
             <a:fld id="{E67D9F0B-A441-444E-8CA3-4D29C317007F}" type="datetimeFigureOut">
               <a:rPr lang="en-GB" smtClean="0"/>
-              <a:t>25/06/2011</a:t>
+              <a:t>14/07/2011</a:t>
             </a:fld>
             <a:endParaRPr lang="en-GB"/>
           </a:p>
@@ -2254,7 +2254,7 @@
           <a:p>
             <a:fld id="{E67D9F0B-A441-444E-8CA3-4D29C317007F}" type="datetimeFigureOut">
               <a:rPr lang="en-GB" smtClean="0"/>
-              <a:t>25/06/2011</a:t>
+              <a:t>14/07/2011</a:t>
             </a:fld>
             <a:endParaRPr lang="en-GB"/>
           </a:p>
@@ -2507,7 +2507,7 @@
           <a:p>
             <a:fld id="{E67D9F0B-A441-444E-8CA3-4D29C317007F}" type="datetimeFigureOut">
               <a:rPr lang="en-GB" smtClean="0"/>
-              <a:t>25/06/2011</a:t>
+              <a:t>14/07/2011</a:t>
             </a:fld>
             <a:endParaRPr lang="en-GB"/>
           </a:p>
@@ -2720,7 +2720,7 @@
           <a:p>
             <a:fld id="{E67D9F0B-A441-444E-8CA3-4D29C317007F}" type="datetimeFigureOut">
               <a:rPr lang="en-GB" smtClean="0"/>
-              <a:t>25/06/2011</a:t>
+              <a:t>14/07/2011</a:t>
             </a:fld>
             <a:endParaRPr lang="en-GB"/>
           </a:p>
@@ -3322,7 +3322,7 @@
         </p:nvSpPr>
         <p:spPr>
           <a:xfrm>
-            <a:off x="1475656" y="3686850"/>
+            <a:off x="1475656" y="3949315"/>
             <a:ext cx="2376264" cy="2143981"/>
           </a:xfrm>
           <a:prstGeom prst="can">
@@ -3362,7 +3362,7 @@
         </p:nvSpPr>
         <p:spPr>
           <a:xfrm>
-            <a:off x="1619672" y="4262914"/>
+            <a:off x="1619672" y="4525379"/>
             <a:ext cx="2088232" cy="360040"/>
           </a:xfrm>
           <a:prstGeom prst="rect">
@@ -3404,7 +3404,7 @@
         </p:nvSpPr>
         <p:spPr>
           <a:xfrm>
-            <a:off x="1619672" y="4766970"/>
+            <a:off x="1619672" y="5029435"/>
             <a:ext cx="2088232" cy="360040"/>
           </a:xfrm>
           <a:prstGeom prst="rect">
@@ -3446,7 +3446,7 @@
         </p:nvSpPr>
         <p:spPr>
           <a:xfrm>
-            <a:off x="1619672" y="5271026"/>
+            <a:off x="1619672" y="5533491"/>
             <a:ext cx="2088232" cy="360040"/>
           </a:xfrm>
           <a:prstGeom prst="rect">
@@ -3488,7 +3488,7 @@
         </p:nvSpPr>
         <p:spPr>
           <a:xfrm>
-            <a:off x="6588224" y="4977172"/>
+            <a:off x="6588224" y="5841268"/>
             <a:ext cx="2376264" cy="900100"/>
           </a:xfrm>
           <a:prstGeom prst="can">
@@ -3563,15 +3563,7 @@
             </a:r>
             <a:r>
               <a:rPr lang="en-GB" sz="1400" dirty="0" smtClean="0"/>
-              <a:t>/</a:t>
-            </a:r>
-            <a:r>
-              <a:rPr lang="en-GB" sz="1400" dirty="0" smtClean="0"/>
-              <a:t>branche</a:t>
-            </a:r>
-            <a:r>
-              <a:rPr lang="en-GB" sz="1400" dirty="0" smtClean="0"/>
-              <a:t>s/</a:t>
+              <a:t>/branches/</a:t>
             </a:r>
             <a:r>
               <a:rPr lang="en-GB" sz="1400" dirty="0" err="1" smtClean="0"/>
@@ -3593,7 +3585,7 @@
         </p:nvSpPr>
         <p:spPr>
           <a:xfrm>
-            <a:off x="6865317" y="5013176"/>
+            <a:off x="6937325" y="5929535"/>
             <a:ext cx="1667123" cy="307777"/>
           </a:xfrm>
           <a:prstGeom prst="rect">
@@ -3609,13 +3601,9 @@
           <a:p>
             <a:r>
               <a:rPr lang="en-GB" sz="1400" dirty="0" smtClean="0"/>
-              <a:t>Maven </a:t>
-            </a:r>
-            <a:r>
-              <a:rPr lang="en-GB" sz="1400" smtClean="0"/>
-              <a:t>Central Repo</a:t>
-            </a:r>
-            <a:endParaRPr lang="en-GB" sz="1400"/>
+              <a:t>Maven Central Repo</a:t>
+            </a:r>
+            <a:endParaRPr lang="en-GB" sz="1400" dirty="0"/>
           </a:p>
         </p:txBody>
       </p:sp>
@@ -3627,7 +3615,7 @@
         </p:nvSpPr>
         <p:spPr>
           <a:xfrm>
-            <a:off x="1763688" y="3758858"/>
+            <a:off x="1763688" y="4021323"/>
             <a:ext cx="1673792" cy="307777"/>
           </a:xfrm>
           <a:prstGeom prst="rect">
@@ -3718,11 +3706,11 @@
         <p:spPr>
           <a:xfrm>
             <a:off x="6588224" y="2888940"/>
-            <a:ext cx="2376264" cy="1361306"/>
+            <a:ext cx="2376264" cy="2700300"/>
           </a:xfrm>
           <a:prstGeom prst="can">
             <a:avLst>
-              <a:gd name="adj" fmla="val 31209"/>
+              <a:gd name="adj" fmla="val 20082"/>
             </a:avLst>
           </a:prstGeom>
         </p:spPr>
@@ -3795,7 +3783,7 @@
         </p:nvSpPr>
         <p:spPr>
           <a:xfrm>
-            <a:off x="6732240" y="3456384"/>
+            <a:off x="6732240" y="4896544"/>
             <a:ext cx="2088232" cy="476672"/>
           </a:xfrm>
           <a:prstGeom prst="rect">
@@ -3903,8 +3891,8 @@
         </p:nvSpPr>
         <p:spPr>
           <a:xfrm>
-            <a:off x="4211960" y="189726"/>
-            <a:ext cx="1728192" cy="646986"/>
+            <a:off x="4695303" y="257830"/>
+            <a:ext cx="1316857" cy="510778"/>
           </a:xfrm>
           <a:prstGeom prst="wedgeRoundRectCallout">
             <a:avLst>
@@ -3937,22 +3925,18 @@
           <a:p>
             <a:pPr algn="ctr"/>
             <a:r>
-              <a:rPr lang="en-GB" sz="1600" dirty="0" smtClean="0"/>
+              <a:rPr lang="en-GB" sz="1200" dirty="0" smtClean="0"/>
               <a:t>1. </a:t>
             </a:r>
             <a:r>
-              <a:rPr lang="en-GB" sz="1600" dirty="0" err="1" smtClean="0"/>
+              <a:rPr lang="en-GB" sz="1200" dirty="0" err="1" smtClean="0"/>
               <a:t>svn</a:t>
             </a:r>
             <a:r>
-              <a:rPr lang="en-GB" sz="1600" dirty="0" smtClean="0"/>
-              <a:t> </a:t>
-            </a:r>
-            <a:r>
-              <a:rPr lang="en-GB" sz="1600" dirty="0" smtClean="0"/>
-              <a:t>checkout  update / commit</a:t>
-            </a:r>
-            <a:endParaRPr lang="en-GB" sz="1600" dirty="0"/>
+              <a:rPr lang="en-GB" sz="1200" dirty="0" smtClean="0"/>
+              <a:t> checkout  update / commit</a:t>
+            </a:r>
+            <a:endParaRPr lang="en-GB" sz="1200" dirty="0"/>
           </a:p>
         </p:txBody>
       </p:sp>
@@ -4052,11 +4036,11 @@
         <p:spPr>
           <a:xfrm>
             <a:off x="3707904" y="2240868"/>
-            <a:ext cx="12700" cy="2706122"/>
+            <a:ext cx="12700" cy="2968587"/>
           </a:xfrm>
           <a:prstGeom prst="curvedConnector3">
             <a:avLst>
-              <a:gd name="adj1" fmla="val 7580283"/>
+              <a:gd name="adj1" fmla="val 7785543"/>
             </a:avLst>
           </a:prstGeom>
           <a:ln w="22225">
@@ -4093,12 +4077,12 @@
         </p:nvCxnSpPr>
         <p:spPr>
           <a:xfrm rot="10800000" flipV="1">
-            <a:off x="1619672" y="1088740"/>
-            <a:ext cx="12700" cy="3354194"/>
+            <a:off x="1619672" y="1088739"/>
+            <a:ext cx="12700" cy="3616659"/>
           </a:xfrm>
           <a:prstGeom prst="curvedConnector3">
             <a:avLst>
-              <a:gd name="adj1" fmla="val 9101409"/>
+              <a:gd name="adj1" fmla="val 8566268"/>
             </a:avLst>
           </a:prstGeom>
           <a:ln w="22225">
@@ -4132,8 +4116,8 @@
         </p:nvSpPr>
         <p:spPr>
           <a:xfrm>
-            <a:off x="827584" y="2636912"/>
-            <a:ext cx="1584176" cy="374571"/>
+            <a:off x="827584" y="2670964"/>
+            <a:ext cx="1224136" cy="306467"/>
           </a:xfrm>
           <a:prstGeom prst="wedgeRoundRectCallout">
             <a:avLst>
@@ -4159,25 +4143,25 @@
           </a:fontRef>
         </p:style>
         <p:txBody>
-          <a:bodyPr rtlCol="0" anchor="ctr">
+          <a:bodyPr wrap="square" rtlCol="0" anchor="ctr">
             <a:spAutoFit/>
           </a:bodyPr>
           <a:lstStyle/>
           <a:p>
             <a:pPr algn="ctr"/>
             <a:r>
-              <a:rPr lang="en-GB" sz="1600" dirty="0" smtClean="0"/>
+              <a:rPr lang="en-GB" sz="1200" dirty="0" smtClean="0"/>
               <a:t>3. </a:t>
             </a:r>
             <a:r>
-              <a:rPr lang="en-GB" sz="1600" dirty="0" err="1" smtClean="0"/>
+              <a:rPr lang="en-GB" sz="1200" dirty="0" err="1" smtClean="0"/>
               <a:t>mvn</a:t>
             </a:r>
             <a:r>
-              <a:rPr lang="en-GB" sz="1600" dirty="0" smtClean="0"/>
+              <a:rPr lang="en-GB" sz="1200" dirty="0" smtClean="0"/>
               <a:t> deploy</a:t>
             </a:r>
-            <a:endParaRPr lang="en-GB" sz="1600" dirty="0"/>
+            <a:endParaRPr lang="en-GB" sz="1200" dirty="0"/>
           </a:p>
         </p:txBody>
       </p:sp>
@@ -4189,13 +4173,13 @@
         </p:nvSpPr>
         <p:spPr>
           <a:xfrm>
-            <a:off x="107504" y="620688"/>
-            <a:ext cx="864095" cy="646986"/>
+            <a:off x="187896" y="790947"/>
+            <a:ext cx="1107740" cy="306467"/>
           </a:xfrm>
           <a:prstGeom prst="wedgeRoundRectCallout">
             <a:avLst>
-              <a:gd name="adj1" fmla="val 98403"/>
-              <a:gd name="adj2" fmla="val 61292"/>
+              <a:gd name="adj1" fmla="val 48563"/>
+              <a:gd name="adj2" fmla="val 108025"/>
               <a:gd name="adj3" fmla="val 16667"/>
             </a:avLst>
           </a:prstGeom>
@@ -4216,25 +4200,25 @@
           </a:fontRef>
         </p:style>
         <p:txBody>
-          <a:bodyPr rtlCol="0" anchor="ctr">
+          <a:bodyPr wrap="square" rtlCol="0" anchor="ctr">
             <a:spAutoFit/>
           </a:bodyPr>
           <a:lstStyle/>
           <a:p>
             <a:pPr algn="ctr"/>
             <a:r>
-              <a:rPr lang="en-GB" sz="1600" dirty="0" smtClean="0"/>
+              <a:rPr lang="en-GB" sz="1200" dirty="0" smtClean="0"/>
               <a:t>2. </a:t>
             </a:r>
             <a:r>
-              <a:rPr lang="en-GB" sz="1600" dirty="0" err="1" smtClean="0"/>
+              <a:rPr lang="en-GB" sz="1200" dirty="0" err="1" smtClean="0"/>
               <a:t>mvn</a:t>
             </a:r>
             <a:r>
-              <a:rPr lang="en-GB" sz="1600" dirty="0" smtClean="0"/>
+              <a:rPr lang="en-GB" sz="1200" dirty="0" smtClean="0"/>
               <a:t> install</a:t>
             </a:r>
-            <a:endParaRPr lang="en-GB" sz="1600" dirty="0"/>
+            <a:endParaRPr lang="en-GB" sz="1200" dirty="0"/>
           </a:p>
         </p:txBody>
       </p:sp>
@@ -4246,8 +4230,8 @@
         </p:nvSpPr>
         <p:spPr>
           <a:xfrm>
-            <a:off x="1907704" y="3140968"/>
-            <a:ext cx="2241052" cy="374571"/>
+            <a:off x="2546972" y="3175020"/>
+            <a:ext cx="1736996" cy="306467"/>
           </a:xfrm>
           <a:prstGeom prst="wedgeRoundRectCallout">
             <a:avLst>
@@ -4273,94 +4257,33 @@
           </a:fontRef>
         </p:style>
         <p:txBody>
-          <a:bodyPr rtlCol="0" anchor="ctr">
+          <a:bodyPr wrap="square" rtlCol="0" anchor="ctr">
             <a:spAutoFit/>
           </a:bodyPr>
           <a:lstStyle/>
           <a:p>
             <a:pPr algn="ctr"/>
             <a:r>
-              <a:rPr lang="en-GB" sz="1600" dirty="0" smtClean="0"/>
-              <a:t>6. </a:t>
-            </a:r>
-            <a:r>
-              <a:rPr lang="en-GB" sz="1600" dirty="0" err="1" smtClean="0"/>
+              <a:rPr lang="en-GB" sz="1200" dirty="0"/>
+              <a:t>6</a:t>
+            </a:r>
+            <a:r>
+              <a:rPr lang="en-GB" sz="1200" dirty="0" smtClean="0"/>
+              <a:t>. </a:t>
+            </a:r>
+            <a:r>
+              <a:rPr lang="en-GB" sz="1200" dirty="0" err="1" smtClean="0"/>
               <a:t>mvn</a:t>
             </a:r>
             <a:r>
-              <a:rPr lang="en-GB" sz="1600" dirty="0" smtClean="0"/>
+              <a:rPr lang="en-GB" sz="1200" dirty="0" smtClean="0"/>
               <a:t> </a:t>
             </a:r>
             <a:r>
-              <a:rPr lang="en-GB" sz="1600" dirty="0" err="1" smtClean="0"/>
+              <a:rPr lang="en-GB" sz="1200" dirty="0" err="1" smtClean="0"/>
               <a:t>release:perform</a:t>
             </a:r>
-            <a:endParaRPr lang="en-GB" sz="1600" dirty="0"/>
-          </a:p>
-        </p:txBody>
-      </p:sp>
-      <p:sp>
-        <p:nvSpPr>
-          <p:cNvPr id="43" name="Rounded Rectangular Callout 42"/>
-          <p:cNvSpPr/>
-          <p:nvPr/>
-        </p:nvSpPr>
-        <p:spPr>
-          <a:xfrm>
-            <a:off x="4067944" y="2420888"/>
-            <a:ext cx="2304256" cy="374571"/>
-          </a:xfrm>
-          <a:prstGeom prst="wedgeRoundRectCallout">
-            <a:avLst>
-              <a:gd name="adj1" fmla="val 44377"/>
-              <a:gd name="adj2" fmla="val -112275"/>
-              <a:gd name="adj3" fmla="val 16667"/>
-            </a:avLst>
-          </a:prstGeom>
-          <a:ln w="12700"/>
-        </p:spPr>
-        <p:style>
-          <a:lnRef idx="2">
-            <a:schemeClr val="accent1"/>
-          </a:lnRef>
-          <a:fillRef idx="1">
-            <a:schemeClr val="lt1"/>
-          </a:fillRef>
-          <a:effectRef idx="0">
-            <a:schemeClr val="accent1"/>
-          </a:effectRef>
-          <a:fontRef idx="minor">
-            <a:schemeClr val="dk1"/>
-          </a:fontRef>
-        </p:style>
-        <p:txBody>
-          <a:bodyPr rtlCol="0" anchor="ctr">
-            <a:spAutoFit/>
-          </a:bodyPr>
-          <a:lstStyle/>
-          <a:p>
-            <a:pPr algn="ctr"/>
-            <a:r>
-              <a:rPr lang="en-GB" sz="1600" dirty="0"/>
-              <a:t>5</a:t>
-            </a:r>
-            <a:r>
-              <a:rPr lang="en-GB" sz="1600" dirty="0" smtClean="0"/>
-              <a:t>. </a:t>
-            </a:r>
-            <a:r>
-              <a:rPr lang="en-GB" sz="1600" dirty="0" err="1" smtClean="0"/>
-              <a:t>mvn</a:t>
-            </a:r>
-            <a:r>
-              <a:rPr lang="en-GB" sz="1600" dirty="0" smtClean="0"/>
-              <a:t> </a:t>
-            </a:r>
-            <a:r>
-              <a:rPr lang="en-GB" sz="1600" dirty="0" err="1" smtClean="0"/>
-              <a:t>release:prepare</a:t>
-            </a:r>
-            <a:endParaRPr lang="en-GB" sz="1600" dirty="0"/>
+            <a:endParaRPr lang="en-GB" sz="1200" dirty="0"/>
           </a:p>
         </p:txBody>
       </p:sp>
@@ -4375,7 +4298,7 @@
         </p:nvCxnSpPr>
         <p:spPr>
           <a:xfrm rot="10800000" flipV="1">
-            <a:off x="1619672" y="4946990"/>
+            <a:off x="1619672" y="5209455"/>
             <a:ext cx="12700" cy="504056"/>
           </a:xfrm>
           <a:prstGeom prst="curvedConnector3">
@@ -4414,13 +4337,13 @@
         </p:nvSpPr>
         <p:spPr>
           <a:xfrm>
-            <a:off x="323528" y="5992192"/>
-            <a:ext cx="1944216" cy="646986"/>
+            <a:off x="179512" y="6158582"/>
+            <a:ext cx="1440160" cy="510778"/>
           </a:xfrm>
           <a:prstGeom prst="wedgeRoundRectCallout">
             <a:avLst>
-              <a:gd name="adj1" fmla="val -4560"/>
-              <a:gd name="adj2" fmla="val -151703"/>
+              <a:gd name="adj1" fmla="val 26039"/>
+              <a:gd name="adj2" fmla="val -143076"/>
               <a:gd name="adj3" fmla="val 16667"/>
             </a:avLst>
           </a:prstGeom>
@@ -4448,25 +4371,17 @@
           <a:p>
             <a:pPr algn="ctr"/>
             <a:r>
-              <a:rPr lang="en-GB" sz="1600" dirty="0" smtClean="0"/>
-              <a:t>9. </a:t>
-            </a:r>
-            <a:r>
-              <a:rPr lang="en-GB" sz="1600" dirty="0" smtClean="0"/>
-              <a:t>promote release</a:t>
-            </a:r>
-            <a:r>
-              <a:rPr lang="en-GB" sz="1600" dirty="0" smtClean="0"/>
-              <a:t/>
+              <a:rPr lang="en-GB" sz="1200" dirty="0" smtClean="0"/>
+              <a:t>9. promote release</a:t>
             </a:r>
             <a:br>
-              <a:rPr lang="en-GB" sz="1600" dirty="0" smtClean="0"/>
+              <a:rPr lang="en-GB" sz="1200" dirty="0" smtClean="0"/>
             </a:br>
             <a:r>
-              <a:rPr lang="en-GB" sz="1600" dirty="0" smtClean="0"/>
+              <a:rPr lang="en-GB" sz="1200" dirty="0" smtClean="0"/>
               <a:t>(Nexus console)</a:t>
             </a:r>
-            <a:endParaRPr lang="en-GB" sz="1600" dirty="0"/>
+            <a:endParaRPr lang="en-GB" sz="1200" dirty="0"/>
           </a:p>
         </p:txBody>
       </p:sp>
@@ -4474,15 +4389,15 @@
         <p:nvCxnSpPr>
           <p:cNvPr id="75" name="Curved Connector 74"/>
           <p:cNvCxnSpPr>
-            <a:stCxn id="11" idx="3"/>
+            <a:stCxn id="12" idx="3"/>
             <a:endCxn id="24" idx="1"/>
           </p:cNvCxnSpPr>
           <p:nvPr/>
         </p:nvCxnSpPr>
         <p:spPr>
           <a:xfrm flipV="1">
-            <a:off x="3707904" y="3694720"/>
-            <a:ext cx="3024336" cy="1252270"/>
+            <a:off x="3707904" y="5134880"/>
+            <a:ext cx="3024336" cy="578631"/>
           </a:xfrm>
           <a:prstGeom prst="curvedConnector3">
             <a:avLst>
@@ -4520,8 +4435,8 @@
         </p:nvSpPr>
         <p:spPr>
           <a:xfrm>
-            <a:off x="3923928" y="5718725"/>
-            <a:ext cx="1791816" cy="374571"/>
+            <a:off x="3140224" y="6158582"/>
+            <a:ext cx="1791816" cy="510778"/>
           </a:xfrm>
           <a:prstGeom prst="wedgeRoundRectCallout">
             <a:avLst>
@@ -4554,10 +4469,14 @@
           <a:p>
             <a:pPr algn="ctr"/>
             <a:r>
-              <a:rPr lang="en-GB" sz="1600" dirty="0" smtClean="0"/>
-              <a:t>10. automatic</a:t>
-            </a:r>
-            <a:endParaRPr lang="en-GB" sz="1600" dirty="0"/>
+              <a:rPr lang="en-GB" sz="1200" dirty="0" smtClean="0"/>
+              <a:t>10. </a:t>
+            </a:r>
+            <a:r>
+              <a:rPr lang="en-GB" sz="1200" dirty="0" smtClean="0"/>
+              <a:t>promote to central (automatic)</a:t>
+            </a:r>
+            <a:endParaRPr lang="en-GB" sz="1200" dirty="0"/>
           </a:p>
         </p:txBody>
       </p:sp>
@@ -4569,13 +4488,13 @@
         </p:nvSpPr>
         <p:spPr>
           <a:xfrm>
-            <a:off x="5436096" y="4494589"/>
-            <a:ext cx="2547900" cy="374571"/>
+            <a:off x="5436096" y="5498797"/>
+            <a:ext cx="1800200" cy="306467"/>
           </a:xfrm>
           <a:prstGeom prst="wedgeRoundRectCallout">
             <a:avLst>
-              <a:gd name="adj1" fmla="val -55659"/>
-              <a:gd name="adj2" fmla="val -118948"/>
+              <a:gd name="adj1" fmla="val -52255"/>
+              <a:gd name="adj2" fmla="val -114272"/>
               <a:gd name="adj3" fmla="val 16667"/>
             </a:avLst>
           </a:prstGeom>
@@ -4603,71 +4522,26 @@
           <a:p>
             <a:pPr algn="ctr"/>
             <a:r>
-              <a:rPr lang="en-GB" sz="1600" dirty="0" smtClean="0"/>
-              <a:t>8. copy </a:t>
-            </a:r>
-            <a:r>
-              <a:rPr lang="en-GB" sz="1600" dirty="0" err="1" smtClean="0"/>
+              <a:rPr lang="en-GB" sz="1200" dirty="0" smtClean="0"/>
+              <a:t>11. </a:t>
+            </a:r>
+            <a:r>
+              <a:rPr lang="en-GB" sz="1200" dirty="0" smtClean="0"/>
+              <a:t>copy </a:t>
+            </a:r>
+            <a:r>
+              <a:rPr lang="en-GB" sz="1200" dirty="0" err="1" smtClean="0"/>
               <a:t>src</a:t>
             </a:r>
             <a:r>
-              <a:rPr lang="en-GB" sz="1600" dirty="0" smtClean="0"/>
-              <a:t> release to </a:t>
-            </a:r>
-            <a:r>
-              <a:rPr lang="en-GB" sz="1600" dirty="0" err="1" smtClean="0"/>
+              <a:rPr lang="en-GB" sz="1200" dirty="0" smtClean="0"/>
+              <a:t> zip to </a:t>
+            </a:r>
+            <a:r>
+              <a:rPr lang="en-GB" sz="1200" dirty="0" err="1" smtClean="0"/>
               <a:t>dist</a:t>
             </a:r>
-            <a:endParaRPr lang="en-GB" sz="1600" dirty="0"/>
-          </a:p>
-        </p:txBody>
-      </p:sp>
-      <p:sp>
-        <p:nvSpPr>
-          <p:cNvPr id="78" name="Rounded Rectangular Callout 77"/>
-          <p:cNvSpPr/>
-          <p:nvPr/>
-        </p:nvSpPr>
-        <p:spPr>
-          <a:xfrm>
-            <a:off x="6084168" y="6022374"/>
-            <a:ext cx="1791816" cy="646986"/>
-          </a:xfrm>
-          <a:prstGeom prst="wedgeRoundRectCallout">
-            <a:avLst>
-              <a:gd name="adj1" fmla="val -4560"/>
-              <a:gd name="adj2" fmla="val -4399"/>
-              <a:gd name="adj3" fmla="val 16667"/>
-            </a:avLst>
-          </a:prstGeom>
-          <a:ln w="12700"/>
-        </p:spPr>
-        <p:style>
-          <a:lnRef idx="2">
-            <a:schemeClr val="accent1"/>
-          </a:lnRef>
-          <a:fillRef idx="1">
-            <a:schemeClr val="lt1"/>
-          </a:fillRef>
-          <a:effectRef idx="0">
-            <a:schemeClr val="accent1"/>
-          </a:effectRef>
-          <a:fontRef idx="minor">
-            <a:schemeClr val="dk1"/>
-          </a:fontRef>
-        </p:style>
-        <p:txBody>
-          <a:bodyPr rtlCol="0" anchor="ctr">
-            <a:spAutoFit/>
-          </a:bodyPr>
-          <a:lstStyle/>
-          <a:p>
-            <a:pPr algn="ctr"/>
-            <a:r>
-              <a:rPr lang="en-GB" sz="1600" dirty="0" smtClean="0"/>
-              <a:t>11. upload new version of site</a:t>
-            </a:r>
-            <a:endParaRPr lang="en-GB" sz="1600" dirty="0"/>
+            <a:endParaRPr lang="en-GB" sz="1200" dirty="0"/>
           </a:p>
         </p:txBody>
       </p:sp>
@@ -4679,13 +4553,13 @@
         </p:nvSpPr>
         <p:spPr>
           <a:xfrm>
-            <a:off x="107504" y="4581128"/>
+            <a:off x="107504" y="4843593"/>
             <a:ext cx="1215752" cy="374571"/>
           </a:xfrm>
           <a:prstGeom prst="wedgeRoundRectCallout">
             <a:avLst>
-              <a:gd name="adj1" fmla="val 94061"/>
-              <a:gd name="adj2" fmla="val 10078"/>
+              <a:gd name="adj1" fmla="val 88624"/>
+              <a:gd name="adj2" fmla="val 33608"/>
               <a:gd name="adj3" fmla="val 16667"/>
             </a:avLst>
           </a:prstGeom>
@@ -4717,11 +4591,7 @@
             <a:pPr algn="ctr"/>
             <a:r>
               <a:rPr lang="en-GB" sz="1600" dirty="0" smtClean="0"/>
-              <a:t>7. </a:t>
-            </a:r>
-            <a:r>
-              <a:rPr lang="en-GB" sz="1600" dirty="0" smtClean="0"/>
-              <a:t>VOTE</a:t>
+              <a:t>8. VOTE</a:t>
             </a:r>
             <a:endParaRPr lang="en-GB" sz="1600" dirty="0"/>
           </a:p>
@@ -4737,9 +4607,9 @@
           <p:nvPr/>
         </p:nvCxnSpPr>
         <p:spPr>
-          <a:xfrm flipV="1">
-            <a:off x="3707904" y="5427222"/>
-            <a:ext cx="2880320" cy="23824"/>
+          <a:xfrm>
+            <a:off x="3707904" y="5713511"/>
+            <a:ext cx="2880320" cy="577807"/>
           </a:xfrm>
           <a:prstGeom prst="curvedConnector3">
             <a:avLst>
@@ -4876,8 +4746,8 @@
         </p:nvSpPr>
         <p:spPr>
           <a:xfrm>
-            <a:off x="4139952" y="1254229"/>
-            <a:ext cx="1584176" cy="374571"/>
+            <a:off x="5004048" y="1268760"/>
+            <a:ext cx="936104" cy="306467"/>
           </a:xfrm>
           <a:prstGeom prst="wedgeRoundRectCallout">
             <a:avLst>
@@ -4903,17 +4773,17 @@
           </a:fontRef>
         </p:style>
         <p:txBody>
-          <a:bodyPr rtlCol="0" anchor="ctr">
+          <a:bodyPr wrap="square" rtlCol="0" anchor="ctr">
             <a:spAutoFit/>
           </a:bodyPr>
           <a:lstStyle/>
           <a:p>
             <a:pPr algn="ctr"/>
             <a:r>
-              <a:rPr lang="en-GB" sz="1600" dirty="0" smtClean="0"/>
+              <a:rPr lang="en-GB" sz="1200" dirty="0" smtClean="0"/>
               <a:t>4. branch</a:t>
             </a:r>
-            <a:endParaRPr lang="en-GB" sz="1600" dirty="0"/>
+            <a:endParaRPr lang="en-GB" sz="1200" dirty="0"/>
           </a:p>
         </p:txBody>
       </p:sp>
@@ -5024,8 +4894,8 @@
         </p:nvSpPr>
         <p:spPr>
           <a:xfrm>
-            <a:off x="4139952" y="1254229"/>
-            <a:ext cx="1584176" cy="374571"/>
+            <a:off x="5004048" y="1268760"/>
+            <a:ext cx="936104" cy="306467"/>
           </a:xfrm>
           <a:prstGeom prst="wedgeRoundRectCallout">
             <a:avLst>
@@ -5051,17 +4921,370 @@
           </a:fontRef>
         </p:style>
         <p:txBody>
-          <a:bodyPr rtlCol="0" anchor="ctr">
+          <a:bodyPr wrap="square" rtlCol="0" anchor="ctr">
             <a:spAutoFit/>
           </a:bodyPr>
           <a:lstStyle/>
           <a:p>
             <a:pPr algn="ctr"/>
             <a:r>
-              <a:rPr lang="en-GB" sz="1600" dirty="0" smtClean="0"/>
+              <a:rPr lang="en-GB" sz="1200" dirty="0" smtClean="0"/>
               <a:t>4. branch</a:t>
             </a:r>
-            <a:endParaRPr lang="en-GB" sz="1600" dirty="0"/>
+            <a:endParaRPr lang="en-GB" sz="1200" dirty="0"/>
+          </a:p>
+        </p:txBody>
+      </p:sp>
+      <p:sp>
+        <p:nvSpPr>
+          <p:cNvPr id="52" name="Rectangle 51"/>
+          <p:cNvSpPr/>
+          <p:nvPr/>
+        </p:nvSpPr>
+        <p:spPr>
+          <a:xfrm>
+            <a:off x="6732240" y="3501008"/>
+            <a:ext cx="2088232" cy="476672"/>
+          </a:xfrm>
+          <a:prstGeom prst="rect">
+            <a:avLst/>
+          </a:prstGeom>
+        </p:spPr>
+        <p:style>
+          <a:lnRef idx="1">
+            <a:schemeClr val="accent4"/>
+          </a:lnRef>
+          <a:fillRef idx="2">
+            <a:schemeClr val="accent4"/>
+          </a:fillRef>
+          <a:effectRef idx="1">
+            <a:schemeClr val="accent4"/>
+          </a:effectRef>
+          <a:fontRef idx="minor">
+            <a:schemeClr val="dk1"/>
+          </a:fontRef>
+        </p:style>
+        <p:txBody>
+          <a:bodyPr rtlCol="0" anchor="ctr"/>
+          <a:lstStyle/>
+          <a:p>
+            <a:pPr algn="ctr"/>
+            <a:r>
+              <a:rPr lang="en-GB" sz="1200" dirty="0" smtClean="0"/>
+              <a:t>/www/incubator.apache.org/</a:t>
+            </a:r>
+            <a:br>
+              <a:rPr lang="en-GB" sz="1200" dirty="0" smtClean="0"/>
+            </a:br>
+            <a:r>
+              <a:rPr lang="en-GB" sz="1200" dirty="0" smtClean="0"/>
+              <a:t>isis-0.x.x</a:t>
+            </a:r>
+            <a:endParaRPr lang="en-GB" sz="1400" dirty="0"/>
+          </a:p>
+        </p:txBody>
+      </p:sp>
+      <p:sp>
+        <p:nvSpPr>
+          <p:cNvPr id="53" name="Rectangle 52"/>
+          <p:cNvSpPr/>
+          <p:nvPr/>
+        </p:nvSpPr>
+        <p:spPr>
+          <a:xfrm>
+            <a:off x="6732240" y="4176464"/>
+            <a:ext cx="2088232" cy="476672"/>
+          </a:xfrm>
+          <a:prstGeom prst="rect">
+            <a:avLst/>
+          </a:prstGeom>
+        </p:spPr>
+        <p:style>
+          <a:lnRef idx="1">
+            <a:schemeClr val="accent4"/>
+          </a:lnRef>
+          <a:fillRef idx="2">
+            <a:schemeClr val="accent4"/>
+          </a:fillRef>
+          <a:effectRef idx="1">
+            <a:schemeClr val="accent4"/>
+          </a:effectRef>
+          <a:fontRef idx="minor">
+            <a:schemeClr val="dk1"/>
+          </a:fontRef>
+        </p:style>
+        <p:txBody>
+          <a:bodyPr rtlCol="0" anchor="ctr"/>
+          <a:lstStyle/>
+          <a:p>
+            <a:pPr algn="ctr"/>
+            <a:r>
+              <a:rPr lang="en-GB" sz="1200" dirty="0" smtClean="0"/>
+              <a:t>/www/incubator.apache.org/</a:t>
+            </a:r>
+            <a:br>
+              <a:rPr lang="en-GB" sz="1200" dirty="0" smtClean="0"/>
+            </a:br>
+            <a:r>
+              <a:rPr lang="en-GB" sz="1200" dirty="0" err="1" smtClean="0"/>
+              <a:t>isis</a:t>
+            </a:r>
+            <a:endParaRPr lang="en-GB" sz="1200" dirty="0"/>
+          </a:p>
+        </p:txBody>
+      </p:sp>
+      <p:cxnSp>
+        <p:nvCxnSpPr>
+          <p:cNvPr id="54" name="Curved Connector 53"/>
+          <p:cNvCxnSpPr>
+            <a:stCxn id="46" idx="3"/>
+            <a:endCxn id="52" idx="1"/>
+          </p:cNvCxnSpPr>
+          <p:nvPr/>
+        </p:nvCxnSpPr>
+        <p:spPr>
+          <a:xfrm>
+            <a:off x="3707904" y="2240868"/>
+            <a:ext cx="3024336" cy="1498476"/>
+          </a:xfrm>
+          <a:prstGeom prst="curvedConnector3">
+            <a:avLst>
+              <a:gd name="adj1" fmla="val 50000"/>
+            </a:avLst>
+          </a:prstGeom>
+          <a:ln w="22225">
+            <a:solidFill>
+              <a:schemeClr val="accent4"/>
+            </a:solidFill>
+            <a:prstDash val="sysDash"/>
+            <a:tailEnd type="arrow" w="lg" len="lg"/>
+          </a:ln>
+        </p:spPr>
+        <p:style>
+          <a:lnRef idx="1">
+            <a:schemeClr val="accent1"/>
+          </a:lnRef>
+          <a:fillRef idx="0">
+            <a:schemeClr val="accent1"/>
+          </a:fillRef>
+          <a:effectRef idx="0">
+            <a:schemeClr val="accent1"/>
+          </a:effectRef>
+          <a:fontRef idx="minor">
+            <a:schemeClr val="tx1"/>
+          </a:fontRef>
+        </p:style>
+      </p:cxnSp>
+      <p:sp>
+        <p:nvSpPr>
+          <p:cNvPr id="43" name="Rounded Rectangular Callout 42"/>
+          <p:cNvSpPr/>
+          <p:nvPr/>
+        </p:nvSpPr>
+        <p:spPr>
+          <a:xfrm>
+            <a:off x="4355976" y="2420888"/>
+            <a:ext cx="1728192" cy="306467"/>
+          </a:xfrm>
+          <a:prstGeom prst="wedgeRoundRectCallout">
+            <a:avLst>
+              <a:gd name="adj1" fmla="val 44377"/>
+              <a:gd name="adj2" fmla="val -112275"/>
+              <a:gd name="adj3" fmla="val 16667"/>
+            </a:avLst>
+          </a:prstGeom>
+          <a:ln w="12700"/>
+        </p:spPr>
+        <p:style>
+          <a:lnRef idx="2">
+            <a:schemeClr val="accent1"/>
+          </a:lnRef>
+          <a:fillRef idx="1">
+            <a:schemeClr val="lt1"/>
+          </a:fillRef>
+          <a:effectRef idx="0">
+            <a:schemeClr val="accent1"/>
+          </a:effectRef>
+          <a:fontRef idx="minor">
+            <a:schemeClr val="dk1"/>
+          </a:fontRef>
+        </p:style>
+        <p:txBody>
+          <a:bodyPr wrap="square" rtlCol="0" anchor="ctr">
+            <a:spAutoFit/>
+          </a:bodyPr>
+          <a:lstStyle/>
+          <a:p>
+            <a:pPr algn="ctr"/>
+            <a:r>
+              <a:rPr lang="en-GB" sz="1200" dirty="0"/>
+              <a:t>5</a:t>
+            </a:r>
+            <a:r>
+              <a:rPr lang="en-GB" sz="1200" dirty="0" smtClean="0"/>
+              <a:t>. </a:t>
+            </a:r>
+            <a:r>
+              <a:rPr lang="en-GB" sz="1200" dirty="0" err="1" smtClean="0"/>
+              <a:t>mvn</a:t>
+            </a:r>
+            <a:r>
+              <a:rPr lang="en-GB" sz="1200" dirty="0" smtClean="0"/>
+              <a:t> </a:t>
+            </a:r>
+            <a:r>
+              <a:rPr lang="en-GB" sz="1200" dirty="0" err="1" smtClean="0"/>
+              <a:t>release:prepare</a:t>
+            </a:r>
+            <a:endParaRPr lang="en-GB" sz="1200" dirty="0"/>
+          </a:p>
+        </p:txBody>
+      </p:sp>
+      <p:sp>
+        <p:nvSpPr>
+          <p:cNvPr id="55" name="Rounded Rectangular Callout 54"/>
+          <p:cNvSpPr/>
+          <p:nvPr/>
+        </p:nvSpPr>
+        <p:spPr>
+          <a:xfrm>
+            <a:off x="5436096" y="2996952"/>
+            <a:ext cx="1216123" cy="306467"/>
+          </a:xfrm>
+          <a:prstGeom prst="wedgeRoundRectCallout">
+            <a:avLst>
+              <a:gd name="adj1" fmla="val -40244"/>
+              <a:gd name="adj2" fmla="val 90585"/>
+              <a:gd name="adj3" fmla="val 16667"/>
+            </a:avLst>
+          </a:prstGeom>
+          <a:ln w="12700"/>
+        </p:spPr>
+        <p:style>
+          <a:lnRef idx="2">
+            <a:schemeClr val="accent1"/>
+          </a:lnRef>
+          <a:fillRef idx="1">
+            <a:schemeClr val="lt1"/>
+          </a:fillRef>
+          <a:effectRef idx="0">
+            <a:schemeClr val="accent1"/>
+          </a:effectRef>
+          <a:fontRef idx="minor">
+            <a:schemeClr val="dk1"/>
+          </a:fontRef>
+        </p:style>
+        <p:txBody>
+          <a:bodyPr wrap="square" rtlCol="0" anchor="ctr">
+            <a:spAutoFit/>
+          </a:bodyPr>
+          <a:lstStyle/>
+          <a:p>
+            <a:pPr algn="ctr"/>
+            <a:r>
+              <a:rPr lang="en-GB" sz="1200" dirty="0"/>
+              <a:t>7</a:t>
+            </a:r>
+            <a:r>
+              <a:rPr lang="en-GB" sz="1200" dirty="0" smtClean="0"/>
+              <a:t>. stage website</a:t>
+            </a:r>
+            <a:endParaRPr lang="en-GB" sz="1200" dirty="0"/>
+          </a:p>
+        </p:txBody>
+      </p:sp>
+      <p:cxnSp>
+        <p:nvCxnSpPr>
+          <p:cNvPr id="56" name="Curved Connector 55"/>
+          <p:cNvCxnSpPr>
+            <a:stCxn id="52" idx="1"/>
+            <a:endCxn id="53" idx="1"/>
+          </p:cNvCxnSpPr>
+          <p:nvPr/>
+        </p:nvCxnSpPr>
+        <p:spPr>
+          <a:xfrm rot="10800000" flipV="1">
+            <a:off x="6732240" y="3739344"/>
+            <a:ext cx="12700" cy="675456"/>
+          </a:xfrm>
+          <a:prstGeom prst="curvedConnector3">
+            <a:avLst>
+              <a:gd name="adj1" fmla="val 2667472"/>
+            </a:avLst>
+          </a:prstGeom>
+          <a:ln w="22225">
+            <a:solidFill>
+              <a:schemeClr val="accent4"/>
+            </a:solidFill>
+            <a:prstDash val="sysDash"/>
+            <a:tailEnd type="arrow" w="lg" len="lg"/>
+          </a:ln>
+        </p:spPr>
+        <p:style>
+          <a:lnRef idx="1">
+            <a:schemeClr val="accent1"/>
+          </a:lnRef>
+          <a:fillRef idx="0">
+            <a:schemeClr val="accent1"/>
+          </a:fillRef>
+          <a:effectRef idx="0">
+            <a:schemeClr val="accent1"/>
+          </a:effectRef>
+          <a:fontRef idx="minor">
+            <a:schemeClr val="tx1"/>
+          </a:fontRef>
+        </p:style>
+      </p:cxnSp>
+      <p:sp>
+        <p:nvSpPr>
+          <p:cNvPr id="57" name="Rounded Rectangular Callout 56"/>
+          <p:cNvSpPr/>
+          <p:nvPr/>
+        </p:nvSpPr>
+        <p:spPr>
+          <a:xfrm>
+            <a:off x="4788024" y="4490685"/>
+            <a:ext cx="1670314" cy="306467"/>
+          </a:xfrm>
+          <a:prstGeom prst="wedgeRoundRectCallout">
+            <a:avLst>
+              <a:gd name="adj1" fmla="val 50735"/>
+              <a:gd name="adj2" fmla="val -114272"/>
+              <a:gd name="adj3" fmla="val 16667"/>
+            </a:avLst>
+          </a:prstGeom>
+          <a:ln w="12700"/>
+        </p:spPr>
+        <p:style>
+          <a:lnRef idx="2">
+            <a:schemeClr val="accent1"/>
+          </a:lnRef>
+          <a:fillRef idx="1">
+            <a:schemeClr val="lt1"/>
+          </a:fillRef>
+          <a:effectRef idx="0">
+            <a:schemeClr val="accent1"/>
+          </a:effectRef>
+          <a:fontRef idx="minor">
+            <a:schemeClr val="dk1"/>
+          </a:fontRef>
+        </p:style>
+        <p:txBody>
+          <a:bodyPr wrap="square" rtlCol="0" anchor="ctr">
+            <a:spAutoFit/>
+          </a:bodyPr>
+          <a:lstStyle/>
+          <a:p>
+            <a:pPr algn="ctr"/>
+            <a:r>
+              <a:rPr lang="en-GB" sz="1200" dirty="0" smtClean="0"/>
+              <a:t>12. </a:t>
+            </a:r>
+            <a:r>
+              <a:rPr lang="en-GB" sz="1200" dirty="0" smtClean="0"/>
+              <a:t>promote website</a:t>
+            </a:r>
+            <a:endParaRPr lang="en-GB" sz="1200" dirty="0"/>
           </a:p>
         </p:txBody>
       </p:sp>

</xml_diff>